<commit_message>
Fixing PDF build (can't have underscore in figure captions like in vocab chapter). Making vocab chapter hyperlinks book-friendly. Increasing font size in concept ancestor figure.
</commit_message>
<xml_diff>
--- a/extras/FiguresStandardizedVocabularies.pptx
+++ b/extras/FiguresStandardizedVocabularies.pptx
@@ -10383,8 +10383,8 @@
         </p:nvSpPr>
         <p:spPr bwMode="auto">
           <a:xfrm>
-            <a:off x="3810000" y="4478337"/>
-            <a:ext cx="1524000" cy="246063"/>
+            <a:off x="3657600" y="4623665"/>
+            <a:ext cx="1828800" cy="307777"/>
           </a:xfrm>
           <a:prstGeom prst="rect">
             <a:avLst/>
@@ -10421,7 +10421,7 @@
               <a:defRPr/>
             </a:pPr>
             <a:r>
-              <a:rPr lang="en-US" sz="1000" dirty="0">
+              <a:rPr lang="en-US" dirty="0">
                 <a:latin typeface="Arial" charset="0"/>
                 <a:cs typeface="Arial" charset="0"/>
               </a:rPr>
@@ -10446,8 +10446,8 @@
         </p:nvSpPr>
         <p:spPr bwMode="auto">
           <a:xfrm>
-            <a:off x="2895600" y="3944937"/>
-            <a:ext cx="1447800" cy="246063"/>
+            <a:off x="2895600" y="4034590"/>
+            <a:ext cx="1447800" cy="307777"/>
           </a:xfrm>
           <a:prstGeom prst="rect">
             <a:avLst/>
@@ -10484,7 +10484,7 @@
               <a:defRPr/>
             </a:pPr>
             <a:r>
-              <a:rPr lang="en-US" sz="1000" dirty="0">
+              <a:rPr lang="en-US" dirty="0">
                 <a:latin typeface="Arial" charset="0"/>
                 <a:cs typeface="Arial" charset="0"/>
               </a:rPr>
@@ -10509,8 +10509,8 @@
         </p:nvSpPr>
         <p:spPr bwMode="auto">
           <a:xfrm>
-            <a:off x="4724400" y="3944937"/>
-            <a:ext cx="1447800" cy="246063"/>
+            <a:off x="4724400" y="4034590"/>
+            <a:ext cx="1549400" cy="307777"/>
           </a:xfrm>
           <a:prstGeom prst="rect">
             <a:avLst/>
@@ -10535,7 +10535,7 @@
           </a:effectLst>
         </p:spPr>
         <p:txBody>
-          <a:bodyPr>
+          <a:bodyPr wrap="square">
             <a:spAutoFit/>
           </a:bodyPr>
           <a:lstStyle/>
@@ -10547,7 +10547,7 @@
               <a:defRPr/>
             </a:pPr>
             <a:r>
-              <a:rPr lang="en-US" sz="1000" dirty="0">
+              <a:rPr lang="en-US" dirty="0">
                 <a:latin typeface="Arial" charset="0"/>
                 <a:cs typeface="Arial" charset="0"/>
               </a:rPr>
@@ -10572,8 +10572,8 @@
         </p:nvSpPr>
         <p:spPr bwMode="auto">
           <a:xfrm>
-            <a:off x="3810000" y="3257490"/>
-            <a:ext cx="1524000" cy="400110"/>
+            <a:off x="3657600" y="3257490"/>
+            <a:ext cx="1828800" cy="523220"/>
           </a:xfrm>
           <a:prstGeom prst="rect">
             <a:avLst/>
@@ -10610,7 +10610,7 @@
               <a:defRPr/>
             </a:pPr>
             <a:r>
-              <a:rPr lang="en-US" sz="1000" dirty="0">
+              <a:rPr lang="en-US" dirty="0">
                 <a:latin typeface="Arial" charset="0"/>
                 <a:cs typeface="Arial" charset="0"/>
               </a:rPr>
@@ -10635,8 +10635,8 @@
         </p:nvSpPr>
         <p:spPr bwMode="auto">
           <a:xfrm>
-            <a:off x="3810000" y="2743200"/>
-            <a:ext cx="1524000" cy="246063"/>
+            <a:off x="3657600" y="2743200"/>
+            <a:ext cx="1828800" cy="307777"/>
           </a:xfrm>
           <a:prstGeom prst="rect">
             <a:avLst/>
@@ -10673,7 +10673,7 @@
               <a:defRPr/>
             </a:pPr>
             <a:r>
-              <a:rPr lang="en-US" sz="1000" dirty="0">
+              <a:rPr lang="en-US" dirty="0">
                 <a:latin typeface="Arial" charset="0"/>
                 <a:cs typeface="Arial" charset="0"/>
               </a:rPr>
@@ -10698,8 +10698,8 @@
         </p:nvSpPr>
         <p:spPr bwMode="auto">
           <a:xfrm>
-            <a:off x="3810000" y="2209800"/>
-            <a:ext cx="1524000" cy="246063"/>
+            <a:off x="3657600" y="2209800"/>
+            <a:ext cx="1828800" cy="307777"/>
           </a:xfrm>
           <a:prstGeom prst="rect">
             <a:avLst/>
@@ -10736,7 +10736,7 @@
               <a:defRPr/>
             </a:pPr>
             <a:r>
-              <a:rPr lang="en-US" sz="1000" dirty="0">
+              <a:rPr lang="en-US" dirty="0">
                 <a:latin typeface="Arial" charset="0"/>
                 <a:cs typeface="Arial" charset="0"/>
               </a:rPr>
@@ -10761,8 +10761,8 @@
         </p:nvSpPr>
         <p:spPr bwMode="auto">
           <a:xfrm>
-            <a:off x="3810000" y="1524000"/>
-            <a:ext cx="1524000" cy="400110"/>
+            <a:off x="3657600" y="1245513"/>
+            <a:ext cx="1828800" cy="738664"/>
           </a:xfrm>
           <a:prstGeom prst="rect">
             <a:avLst/>
@@ -10799,7 +10799,7 @@
               <a:defRPr/>
             </a:pPr>
             <a:r>
-              <a:rPr lang="en-US" sz="1000" dirty="0">
+              <a:rPr lang="en-US" dirty="0">
                 <a:latin typeface="Arial" charset="0"/>
                 <a:cs typeface="Arial" charset="0"/>
               </a:rPr>
@@ -10824,8 +10824,8 @@
         </p:nvSpPr>
         <p:spPr bwMode="auto">
           <a:xfrm>
-            <a:off x="1295400" y="5181600"/>
-            <a:ext cx="914400" cy="553998"/>
+            <a:off x="937260" y="5331117"/>
+            <a:ext cx="1066800" cy="738664"/>
           </a:xfrm>
           <a:prstGeom prst="rect">
             <a:avLst/>
@@ -10862,7 +10862,7 @@
               <a:defRPr/>
             </a:pPr>
             <a:r>
-              <a:rPr lang="en-US" sz="1000" dirty="0">
+              <a:rPr lang="en-US" dirty="0">
                 <a:latin typeface="Arial" charset="0"/>
                 <a:cs typeface="Arial" charset="0"/>
               </a:rPr>
@@ -10887,8 +10887,8 @@
         </p:nvSpPr>
         <p:spPr bwMode="auto">
           <a:xfrm>
-            <a:off x="2438400" y="5181600"/>
-            <a:ext cx="914400" cy="553998"/>
+            <a:off x="2149348" y="5331117"/>
+            <a:ext cx="1066800" cy="738664"/>
           </a:xfrm>
           <a:prstGeom prst="rect">
             <a:avLst/>
@@ -10925,12 +10925,12 @@
               <a:defRPr/>
             </a:pPr>
             <a:r>
-              <a:rPr lang="en-US" sz="1000" dirty="0">
+              <a:rPr lang="en-US" dirty="0">
                 <a:cs typeface="Arial" charset="0"/>
               </a:rPr>
               <a:t>Persistent atrial fibrillation</a:t>
             </a:r>
-            <a:endParaRPr lang="en-US" sz="1000" dirty="0">
+            <a:endParaRPr lang="en-US" dirty="0">
               <a:latin typeface="Arial" charset="0"/>
               <a:cs typeface="Arial" charset="0"/>
             </a:endParaRPr>
@@ -10953,8 +10953,8 @@
         </p:nvSpPr>
         <p:spPr bwMode="auto">
           <a:xfrm>
-            <a:off x="3581400" y="5181600"/>
-            <a:ext cx="914400" cy="553998"/>
+            <a:off x="3361436" y="5331117"/>
+            <a:ext cx="1066800" cy="738664"/>
           </a:xfrm>
           <a:prstGeom prst="rect">
             <a:avLst/>
@@ -10991,12 +10991,12 @@
               <a:defRPr/>
             </a:pPr>
             <a:r>
-              <a:rPr lang="en-US" sz="1000" dirty="0">
+              <a:rPr lang="en-US" dirty="0">
                 <a:cs typeface="Arial" charset="0"/>
               </a:rPr>
               <a:t>Chronic atrial fibrillation</a:t>
             </a:r>
-            <a:endParaRPr lang="en-US" sz="1000" dirty="0">
+            <a:endParaRPr lang="en-US" dirty="0">
               <a:latin typeface="Arial" charset="0"/>
               <a:cs typeface="Arial" charset="0"/>
             </a:endParaRPr>
@@ -11019,8 +11019,8 @@
         </p:nvSpPr>
         <p:spPr bwMode="auto">
           <a:xfrm>
-            <a:off x="4648200" y="5181600"/>
-            <a:ext cx="914400" cy="553998"/>
+            <a:off x="4573524" y="5331117"/>
+            <a:ext cx="1155700" cy="738664"/>
           </a:xfrm>
           <a:prstGeom prst="rect">
             <a:avLst/>
@@ -11057,12 +11057,12 @@
               <a:defRPr/>
             </a:pPr>
             <a:r>
-              <a:rPr lang="en-US" sz="1000" dirty="0">
+              <a:rPr lang="en-US" dirty="0">
                 <a:cs typeface="Arial" charset="0"/>
               </a:rPr>
               <a:t>Paroxysmal atrial fibrillation</a:t>
             </a:r>
-            <a:endParaRPr lang="en-US" sz="1000" dirty="0">
+            <a:endParaRPr lang="en-US" dirty="0">
               <a:latin typeface="Arial" charset="0"/>
               <a:cs typeface="Arial" charset="0"/>
             </a:endParaRPr>
@@ -11085,8 +11085,8 @@
         </p:nvSpPr>
         <p:spPr bwMode="auto">
           <a:xfrm>
-            <a:off x="5867400" y="5181600"/>
-            <a:ext cx="762000" cy="553998"/>
+            <a:off x="5874512" y="5331117"/>
+            <a:ext cx="1066800" cy="738664"/>
           </a:xfrm>
           <a:prstGeom prst="rect">
             <a:avLst/>
@@ -11123,12 +11123,12 @@
               <a:defRPr/>
             </a:pPr>
             <a:r>
-              <a:rPr lang="en-US" sz="1000" dirty="0">
+              <a:rPr lang="en-US" dirty="0">
                 <a:cs typeface="Arial" charset="0"/>
               </a:rPr>
               <a:t>Rapid atrial fibrillation</a:t>
             </a:r>
-            <a:endParaRPr lang="en-US" sz="1000" dirty="0">
+            <a:endParaRPr lang="en-US" dirty="0">
               <a:latin typeface="Arial" charset="0"/>
               <a:cs typeface="Arial" charset="0"/>
             </a:endParaRPr>
@@ -11151,8 +11151,8 @@
         </p:nvSpPr>
         <p:spPr bwMode="auto">
           <a:xfrm>
-            <a:off x="6858000" y="5181600"/>
-            <a:ext cx="914400" cy="553998"/>
+            <a:off x="7086599" y="5331117"/>
+            <a:ext cx="1066800" cy="738664"/>
           </a:xfrm>
           <a:prstGeom prst="rect">
             <a:avLst/>
@@ -11189,12 +11189,12 @@
               <a:defRPr/>
             </a:pPr>
             <a:r>
-              <a:rPr lang="en-US" sz="1000" dirty="0">
+              <a:rPr lang="en-US" dirty="0">
                 <a:cs typeface="Arial" charset="0"/>
               </a:rPr>
               <a:t>Permanent atrial fibrillation</a:t>
             </a:r>
-            <a:endParaRPr lang="en-US" sz="1000" dirty="0">
+            <a:endParaRPr lang="en-US" dirty="0">
               <a:latin typeface="Arial" charset="0"/>
               <a:cs typeface="Arial" charset="0"/>
             </a:endParaRPr>
@@ -11211,6 +11211,7 @@
             </a:extLst>
           </p:cNvPr>
           <p:cNvCxnSpPr>
+            <a:cxnSpLocks/>
             <a:stCxn id="5" idx="0"/>
             <a:endCxn id="6" idx="2"/>
           </p:cNvCxnSpPr>
@@ -11218,18 +11219,19 @@
         </p:nvCxnSpPr>
         <p:spPr>
           <a:xfrm flipV="1">
-            <a:off x="4572000" y="2989263"/>
-            <a:ext cx="0" cy="268227"/>
+            <a:off x="4572000" y="3050977"/>
+            <a:ext cx="0" cy="206513"/>
           </a:xfrm>
           <a:prstGeom prst="straightConnector1">
             <a:avLst/>
           </a:prstGeom>
-          <a:ln w="9525">
+          <a:ln w="12700">
             <a:solidFill>
               <a:schemeClr val="tx1"/>
             </a:solidFill>
             <a:tailEnd type="triangle"/>
           </a:ln>
+          <a:effectLst/>
         </p:spPr>
         <p:style>
           <a:lnRef idx="2">
@@ -11256,6 +11258,7 @@
             </a:extLst>
           </p:cNvPr>
           <p:cNvCxnSpPr>
+            <a:cxnSpLocks/>
             <a:stCxn id="6" idx="0"/>
             <a:endCxn id="7" idx="2"/>
           </p:cNvCxnSpPr>
@@ -11263,18 +11266,19 @@
         </p:nvCxnSpPr>
         <p:spPr>
           <a:xfrm flipV="1">
-            <a:off x="4572000" y="2455863"/>
-            <a:ext cx="0" cy="287337"/>
+            <a:off x="4572000" y="2517577"/>
+            <a:ext cx="0" cy="225623"/>
           </a:xfrm>
           <a:prstGeom prst="straightConnector1">
             <a:avLst/>
           </a:prstGeom>
-          <a:ln w="9525">
+          <a:ln w="12700">
             <a:solidFill>
               <a:schemeClr val="tx1"/>
             </a:solidFill>
             <a:tailEnd type="triangle"/>
           </a:ln>
+          <a:effectLst/>
         </p:spPr>
         <p:style>
           <a:lnRef idx="2">
@@ -11301,6 +11305,7 @@
             </a:extLst>
           </p:cNvPr>
           <p:cNvCxnSpPr>
+            <a:cxnSpLocks/>
             <a:stCxn id="7" idx="0"/>
             <a:endCxn id="8" idx="2"/>
           </p:cNvCxnSpPr>
@@ -11308,18 +11313,19 @@
         </p:nvCxnSpPr>
         <p:spPr>
           <a:xfrm flipV="1">
-            <a:off x="4572000" y="1924110"/>
-            <a:ext cx="0" cy="285690"/>
+            <a:off x="4572000" y="1984177"/>
+            <a:ext cx="0" cy="225623"/>
           </a:xfrm>
           <a:prstGeom prst="straightConnector1">
             <a:avLst/>
           </a:prstGeom>
-          <a:ln w="9525">
+          <a:ln w="12700">
             <a:solidFill>
               <a:schemeClr val="tx1"/>
             </a:solidFill>
             <a:tailEnd type="triangle"/>
           </a:ln>
+          <a:effectLst/>
         </p:spPr>
         <p:style>
           <a:lnRef idx="2">
@@ -11346,6 +11352,7 @@
             </a:extLst>
           </p:cNvPr>
           <p:cNvCxnSpPr>
+            <a:cxnSpLocks/>
             <a:stCxn id="3" idx="0"/>
             <a:endCxn id="5" idx="2"/>
           </p:cNvCxnSpPr>
@@ -11353,13 +11360,13 @@
         </p:nvCxnSpPr>
         <p:spPr>
           <a:xfrm flipV="1">
-            <a:off x="3619500" y="3657600"/>
-            <a:ext cx="952500" cy="287337"/>
+            <a:off x="3619500" y="3780710"/>
+            <a:ext cx="952500" cy="253880"/>
           </a:xfrm>
           <a:prstGeom prst="straightConnector1">
             <a:avLst/>
           </a:prstGeom>
-          <a:ln w="9525">
+          <a:ln w="12700">
             <a:solidFill>
               <a:schemeClr val="tx1"/>
             </a:solidFill>
@@ -11392,6 +11399,7 @@
             </a:extLst>
           </p:cNvPr>
           <p:cNvCxnSpPr>
+            <a:cxnSpLocks/>
             <a:stCxn id="4" idx="0"/>
             <a:endCxn id="5" idx="2"/>
           </p:cNvCxnSpPr>
@@ -11399,13 +11407,13 @@
         </p:nvCxnSpPr>
         <p:spPr>
           <a:xfrm flipH="1" flipV="1">
-            <a:off x="4572000" y="3657600"/>
-            <a:ext cx="876300" cy="287337"/>
+            <a:off x="4572000" y="3780710"/>
+            <a:ext cx="927100" cy="253880"/>
           </a:xfrm>
           <a:prstGeom prst="straightConnector1">
             <a:avLst/>
           </a:prstGeom>
-          <a:ln w="9525">
+          <a:ln w="12700">
             <a:solidFill>
               <a:schemeClr val="tx1"/>
             </a:solidFill>
@@ -11438,6 +11446,7 @@
             </a:extLst>
           </p:cNvPr>
           <p:cNvCxnSpPr>
+            <a:cxnSpLocks/>
             <a:stCxn id="2" idx="0"/>
             <a:endCxn id="3" idx="2"/>
           </p:cNvCxnSpPr>
@@ -11445,13 +11454,13 @@
         </p:nvCxnSpPr>
         <p:spPr>
           <a:xfrm flipH="1" flipV="1">
-            <a:off x="3619500" y="4191000"/>
-            <a:ext cx="952500" cy="287337"/>
+            <a:off x="3619500" y="4342367"/>
+            <a:ext cx="952500" cy="281298"/>
           </a:xfrm>
           <a:prstGeom prst="straightConnector1">
             <a:avLst/>
           </a:prstGeom>
-          <a:ln w="9525">
+          <a:ln w="12700">
             <a:solidFill>
               <a:schemeClr val="tx1"/>
             </a:solidFill>
@@ -11484,6 +11493,7 @@
             </a:extLst>
           </p:cNvPr>
           <p:cNvCxnSpPr>
+            <a:cxnSpLocks/>
             <a:stCxn id="2" idx="0"/>
             <a:endCxn id="4" idx="2"/>
           </p:cNvCxnSpPr>
@@ -11491,13 +11501,13 @@
         </p:nvCxnSpPr>
         <p:spPr>
           <a:xfrm flipV="1">
-            <a:off x="4572000" y="4191000"/>
-            <a:ext cx="876300" cy="287337"/>
+            <a:off x="4572000" y="4342367"/>
+            <a:ext cx="927100" cy="281298"/>
           </a:xfrm>
           <a:prstGeom prst="straightConnector1">
             <a:avLst/>
           </a:prstGeom>
-          <a:ln w="9525">
+          <a:ln w="12700">
             <a:solidFill>
               <a:schemeClr val="tx1"/>
             </a:solidFill>
@@ -11530,6 +11540,7 @@
             </a:extLst>
           </p:cNvPr>
           <p:cNvCxnSpPr>
+            <a:cxnSpLocks/>
             <a:stCxn id="2" idx="2"/>
             <a:endCxn id="11" idx="0"/>
           </p:cNvCxnSpPr>
@@ -11537,13 +11548,13 @@
         </p:nvCxnSpPr>
         <p:spPr>
           <a:xfrm flipH="1">
-            <a:off x="4038600" y="4724400"/>
-            <a:ext cx="533400" cy="457200"/>
+            <a:off x="3894836" y="4931442"/>
+            <a:ext cx="677164" cy="399675"/>
           </a:xfrm>
           <a:prstGeom prst="straightConnector1">
             <a:avLst/>
           </a:prstGeom>
-          <a:ln w="9525">
+          <a:ln w="12700">
             <a:solidFill>
               <a:schemeClr val="tx1"/>
             </a:solidFill>
@@ -11576,6 +11587,7 @@
             </a:extLst>
           </p:cNvPr>
           <p:cNvCxnSpPr>
+            <a:cxnSpLocks/>
             <a:stCxn id="2" idx="2"/>
             <a:endCxn id="10" idx="0"/>
           </p:cNvCxnSpPr>
@@ -11583,13 +11595,13 @@
         </p:nvCxnSpPr>
         <p:spPr>
           <a:xfrm flipH="1">
-            <a:off x="2895600" y="4724400"/>
-            <a:ext cx="1676400" cy="457200"/>
+            <a:off x="2682748" y="4931442"/>
+            <a:ext cx="1889252" cy="399675"/>
           </a:xfrm>
           <a:prstGeom prst="straightConnector1">
             <a:avLst/>
           </a:prstGeom>
-          <a:ln w="9525">
+          <a:ln w="12700">
             <a:solidFill>
               <a:schemeClr val="tx1"/>
             </a:solidFill>
@@ -11622,6 +11634,7 @@
             </a:extLst>
           </p:cNvPr>
           <p:cNvCxnSpPr>
+            <a:cxnSpLocks/>
             <a:stCxn id="2" idx="2"/>
             <a:endCxn id="12" idx="0"/>
           </p:cNvCxnSpPr>
@@ -11629,13 +11642,13 @@
         </p:nvCxnSpPr>
         <p:spPr>
           <a:xfrm>
-            <a:off x="4572000" y="4724400"/>
-            <a:ext cx="533400" cy="457200"/>
+            <a:off x="4572000" y="4931442"/>
+            <a:ext cx="579374" cy="399675"/>
           </a:xfrm>
           <a:prstGeom prst="straightConnector1">
             <a:avLst/>
           </a:prstGeom>
-          <a:ln w="9525">
+          <a:ln w="12700">
             <a:solidFill>
               <a:schemeClr val="tx1"/>
             </a:solidFill>
@@ -11668,6 +11681,7 @@
             </a:extLst>
           </p:cNvPr>
           <p:cNvCxnSpPr>
+            <a:cxnSpLocks/>
             <a:stCxn id="2" idx="2"/>
             <a:endCxn id="9" idx="0"/>
           </p:cNvCxnSpPr>
@@ -11675,13 +11689,13 @@
         </p:nvCxnSpPr>
         <p:spPr>
           <a:xfrm flipH="1">
-            <a:off x="1752600" y="4724400"/>
-            <a:ext cx="2819400" cy="457200"/>
+            <a:off x="1470660" y="4931442"/>
+            <a:ext cx="3101340" cy="399675"/>
           </a:xfrm>
           <a:prstGeom prst="straightConnector1">
             <a:avLst/>
           </a:prstGeom>
-          <a:ln w="9525">
+          <a:ln w="12700">
             <a:solidFill>
               <a:schemeClr val="tx1"/>
             </a:solidFill>
@@ -11714,6 +11728,7 @@
             </a:extLst>
           </p:cNvPr>
           <p:cNvCxnSpPr>
+            <a:cxnSpLocks/>
             <a:stCxn id="2" idx="2"/>
             <a:endCxn id="13" idx="0"/>
           </p:cNvCxnSpPr>
@@ -11721,13 +11736,13 @@
         </p:nvCxnSpPr>
         <p:spPr>
           <a:xfrm>
-            <a:off x="4572000" y="4724400"/>
-            <a:ext cx="1676400" cy="457200"/>
+            <a:off x="4572000" y="4931442"/>
+            <a:ext cx="1835912" cy="399675"/>
           </a:xfrm>
           <a:prstGeom prst="straightConnector1">
             <a:avLst/>
           </a:prstGeom>
-          <a:ln w="9525">
+          <a:ln w="12700">
             <a:solidFill>
               <a:schemeClr val="tx1"/>
             </a:solidFill>
@@ -11760,6 +11775,7 @@
             </a:extLst>
           </p:cNvPr>
           <p:cNvCxnSpPr>
+            <a:cxnSpLocks/>
             <a:stCxn id="2" idx="2"/>
             <a:endCxn id="14" idx="0"/>
           </p:cNvCxnSpPr>
@@ -11767,13 +11783,13 @@
         </p:nvCxnSpPr>
         <p:spPr>
           <a:xfrm>
-            <a:off x="4572000" y="4724400"/>
-            <a:ext cx="2743200" cy="457200"/>
+            <a:off x="4572000" y="4931442"/>
+            <a:ext cx="3047999" cy="399675"/>
           </a:xfrm>
           <a:prstGeom prst="straightConnector1">
             <a:avLst/>
           </a:prstGeom>
-          <a:ln w="9525">
+          <a:ln w="12700">
             <a:solidFill>
               <a:schemeClr val="tx1"/>
             </a:solidFill>
@@ -11806,24 +11822,26 @@
             </a:extLst>
           </p:cNvPr>
           <p:cNvCxnSpPr>
+            <a:cxnSpLocks/>
             <a:stCxn id="8" idx="0"/>
           </p:cNvCxnSpPr>
           <p:nvPr/>
         </p:nvCxnSpPr>
         <p:spPr>
           <a:xfrm flipV="1">
-            <a:off x="4572000" y="1219200"/>
+            <a:off x="4572000" y="940713"/>
             <a:ext cx="0" cy="304800"/>
           </a:xfrm>
           <a:prstGeom prst="straightConnector1">
             <a:avLst/>
           </a:prstGeom>
-          <a:ln w="9525">
+          <a:ln w="12700">
             <a:solidFill>
               <a:schemeClr val="tx1"/>
             </a:solidFill>
             <a:tailEnd type="triangle"/>
           </a:ln>
+          <a:effectLst/>
         </p:spPr>
         <p:style>
           <a:lnRef idx="2">
@@ -11854,7 +11872,7 @@
         </p:nvSpPr>
         <p:spPr>
           <a:xfrm>
-            <a:off x="685800" y="4267200"/>
+            <a:off x="685800" y="4356853"/>
             <a:ext cx="2057400" cy="307777"/>
           </a:xfrm>
           <a:prstGeom prst="rect">
@@ -11924,8 +11942,8 @@
         </p:nvCxnSpPr>
         <p:spPr>
           <a:xfrm flipV="1">
-            <a:off x="2743200" y="4343401"/>
-            <a:ext cx="1219200" cy="77688"/>
+            <a:off x="2743200" y="4455291"/>
+            <a:ext cx="1219200" cy="55451"/>
           </a:xfrm>
           <a:prstGeom prst="straightConnector1">
             <a:avLst/>
@@ -11964,7 +11982,7 @@
         </p:nvSpPr>
         <p:spPr>
           <a:xfrm>
-            <a:off x="1600200" y="3505200"/>
+            <a:off x="670560" y="3514486"/>
             <a:ext cx="1143000" cy="307777"/>
           </a:xfrm>
           <a:prstGeom prst="rect">
@@ -12022,14 +12040,16 @@
             </a:extLst>
           </p:cNvPr>
           <p:cNvCxnSpPr>
+            <a:cxnSpLocks/>
             <a:stCxn id="31" idx="3"/>
+            <a:endCxn id="3" idx="1"/>
           </p:cNvCxnSpPr>
           <p:nvPr/>
         </p:nvCxnSpPr>
         <p:spPr>
           <a:xfrm>
-            <a:off x="2743200" y="3659089"/>
-            <a:ext cx="533400" cy="227111"/>
+            <a:off x="1813560" y="3668375"/>
+            <a:ext cx="1082040" cy="520104"/>
           </a:xfrm>
           <a:prstGeom prst="straightConnector1">
             <a:avLst/>
@@ -12054,73 +12074,6 @@
           </a:fontRef>
         </p:style>
       </p:cxnSp>
-      <p:sp>
-        <p:nvSpPr>
-          <p:cNvPr id="33" name="TextBox 32">
-            <a:extLst>
-              <a:ext uri="{FF2B5EF4-FFF2-40B4-BE49-F238E27FC236}">
-                <a16:creationId xmlns:a16="http://schemas.microsoft.com/office/drawing/2014/main" id="{58A657A4-579A-4569-A8B6-2B363290B446}"/>
-              </a:ext>
-            </a:extLst>
-          </p:cNvPr>
-          <p:cNvSpPr txBox="1"/>
-          <p:nvPr/>
-        </p:nvSpPr>
-        <p:spPr>
-          <a:xfrm>
-            <a:off x="6553199" y="1806316"/>
-            <a:ext cx="2133601" cy="307777"/>
-          </a:xfrm>
-          <a:prstGeom prst="rect">
-            <a:avLst/>
-          </a:prstGeom>
-          <a:effectLst/>
-        </p:spPr>
-        <p:style>
-          <a:lnRef idx="2">
-            <a:schemeClr val="accent6"/>
-          </a:lnRef>
-          <a:fillRef idx="1">
-            <a:schemeClr val="lt1"/>
-          </a:fillRef>
-          <a:effectRef idx="0">
-            <a:schemeClr val="accent6"/>
-          </a:effectRef>
-          <a:fontRef idx="minor">
-            <a:schemeClr val="dk1"/>
-          </a:fontRef>
-        </p:style>
-        <p:txBody>
-          <a:bodyPr wrap="square">
-            <a:spAutoFit/>
-          </a:bodyPr>
-          <a:lstStyle/>
-          <a:p>
-            <a:pPr algn="ctr" fontAlgn="auto">
-              <a:spcBef>
-                <a:spcPts val="0"/>
-              </a:spcBef>
-              <a:spcAft>
-                <a:spcPts val="0"/>
-              </a:spcAft>
-              <a:defRPr/>
-            </a:pPr>
-            <a:r>
-              <a:rPr lang="de-DE" dirty="0">
-                <a:solidFill>
-                  <a:srgbClr val="20425A"/>
-                </a:solidFill>
-              </a:rPr>
-              <a:t>Ancestry Relationships</a:t>
-            </a:r>
-            <a:endParaRPr lang="en-US" dirty="0">
-              <a:solidFill>
-                <a:srgbClr val="20425A"/>
-              </a:solidFill>
-            </a:endParaRPr>
-          </a:p>
-        </p:txBody>
-      </p:sp>
       <p:cxnSp>
         <p:nvCxnSpPr>
           <p:cNvPr id="34" name="Straight Arrow Connector 33">
@@ -12138,8 +12091,8 @@
         </p:nvCxnSpPr>
         <p:spPr>
           <a:xfrm flipH="1">
-            <a:off x="6781802" y="2114093"/>
-            <a:ext cx="838198" cy="503020"/>
+            <a:off x="6781800" y="2114093"/>
+            <a:ext cx="838200" cy="705307"/>
           </a:xfrm>
           <a:prstGeom prst="straightConnector1">
             <a:avLst/>
@@ -12174,6 +12127,7 @@
             </a:extLst>
           </p:cNvPr>
           <p:cNvCxnSpPr>
+            <a:cxnSpLocks/>
             <a:stCxn id="2" idx="3"/>
             <a:endCxn id="5" idx="3"/>
           </p:cNvCxnSpPr>
@@ -12181,15 +12135,15 @@
         </p:nvCxnSpPr>
         <p:spPr>
           <a:xfrm flipV="1">
-            <a:off x="5334000" y="3457545"/>
-            <a:ext cx="12700" cy="1143824"/>
+            <a:off x="5486400" y="3519100"/>
+            <a:ext cx="12700" cy="1258454"/>
           </a:xfrm>
           <a:prstGeom prst="curvedConnector3">
             <a:avLst>
-              <a:gd name="adj1" fmla="val 7800002"/>
+              <a:gd name="adj1" fmla="val 8940000"/>
             </a:avLst>
           </a:prstGeom>
-          <a:ln w="9525">
+          <a:ln w="12700">
             <a:solidFill>
               <a:schemeClr val="tx1"/>
             </a:solidFill>
@@ -12223,6 +12177,7 @@
             </a:extLst>
           </p:cNvPr>
           <p:cNvCxnSpPr>
+            <a:cxnSpLocks/>
             <a:stCxn id="2" idx="3"/>
             <a:endCxn id="6" idx="3"/>
           </p:cNvCxnSpPr>
@@ -12230,15 +12185,15 @@
         </p:nvCxnSpPr>
         <p:spPr>
           <a:xfrm flipV="1">
-            <a:off x="5334000" y="2866232"/>
-            <a:ext cx="12700" cy="1735137"/>
+            <a:off x="5486400" y="2897089"/>
+            <a:ext cx="12700" cy="1880465"/>
           </a:xfrm>
           <a:prstGeom prst="curvedConnector3">
             <a:avLst>
-              <a:gd name="adj1" fmla="val 9375003"/>
+              <a:gd name="adj1" fmla="val 11100000"/>
             </a:avLst>
           </a:prstGeom>
-          <a:ln w="9525">
+          <a:ln w="12700">
             <a:solidFill>
               <a:schemeClr val="tx1"/>
             </a:solidFill>
@@ -12272,6 +12227,7 @@
             </a:extLst>
           </p:cNvPr>
           <p:cNvCxnSpPr>
+            <a:cxnSpLocks/>
             <a:stCxn id="2" idx="3"/>
             <a:endCxn id="7" idx="3"/>
           </p:cNvCxnSpPr>
@@ -12279,15 +12235,15 @@
         </p:nvCxnSpPr>
         <p:spPr>
           <a:xfrm flipV="1">
-            <a:off x="5334000" y="2332832"/>
-            <a:ext cx="12700" cy="2268537"/>
+            <a:off x="5486400" y="2363689"/>
+            <a:ext cx="12700" cy="2413865"/>
           </a:xfrm>
           <a:prstGeom prst="curvedConnector3">
             <a:avLst>
-              <a:gd name="adj1" fmla="val 10950003"/>
+              <a:gd name="adj1" fmla="val 13140000"/>
             </a:avLst>
           </a:prstGeom>
-          <a:ln w="9525">
+          <a:ln w="12700">
             <a:solidFill>
               <a:schemeClr val="tx1"/>
             </a:solidFill>
@@ -12329,15 +12285,15 @@
         </p:nvCxnSpPr>
         <p:spPr>
           <a:xfrm flipV="1">
-            <a:off x="5334000" y="1724055"/>
-            <a:ext cx="12700" cy="2877314"/>
+            <a:off x="5486400" y="1614845"/>
+            <a:ext cx="12700" cy="3162709"/>
           </a:xfrm>
           <a:prstGeom prst="curvedConnector3">
             <a:avLst>
-              <a:gd name="adj1" fmla="val 12375004"/>
+              <a:gd name="adj1" fmla="val 15420000"/>
             </a:avLst>
           </a:prstGeom>
-          <a:ln w="9525">
+          <a:ln w="12700">
             <a:solidFill>
               <a:schemeClr val="tx1"/>
             </a:solidFill>
@@ -12371,14 +12327,16 @@
             </a:extLst>
           </p:cNvPr>
           <p:cNvCxnSpPr>
+            <a:cxnSpLocks/>
             <a:stCxn id="40" idx="3"/>
+            <a:endCxn id="6" idx="1"/>
           </p:cNvCxnSpPr>
           <p:nvPr/>
         </p:nvCxnSpPr>
         <p:spPr>
           <a:xfrm>
             <a:off x="2743200" y="2451557"/>
-            <a:ext cx="1066800" cy="367843"/>
+            <a:ext cx="914400" cy="445532"/>
           </a:xfrm>
           <a:prstGeom prst="straightConnector1">
             <a:avLst/>
@@ -12484,7 +12442,7 @@
         </p:nvSpPr>
         <p:spPr>
           <a:xfrm>
-            <a:off x="1295400" y="4800600"/>
+            <a:off x="670560" y="4865262"/>
             <a:ext cx="1295400" cy="307777"/>
           </a:xfrm>
           <a:prstGeom prst="rect">
@@ -12555,8 +12513,8 @@
         </p:nvCxnSpPr>
         <p:spPr>
           <a:xfrm flipV="1">
-            <a:off x="2590800" y="4601369"/>
-            <a:ext cx="1219200" cy="353120"/>
+            <a:off x="1965960" y="4777554"/>
+            <a:ext cx="1691640" cy="241597"/>
           </a:xfrm>
           <a:prstGeom prst="straightConnector1">
             <a:avLst/>
@@ -12591,14 +12549,15 @@
             </a:extLst>
           </p:cNvPr>
           <p:cNvCxnSpPr>
+            <a:cxnSpLocks/>
             <a:stCxn id="44" idx="2"/>
           </p:cNvCxnSpPr>
           <p:nvPr/>
         </p:nvCxnSpPr>
         <p:spPr>
           <a:xfrm flipH="1">
-            <a:off x="6096000" y="1222177"/>
-            <a:ext cx="1028700" cy="682823"/>
+            <a:off x="6328144" y="1222177"/>
+            <a:ext cx="796556" cy="554694"/>
           </a:xfrm>
           <a:prstGeom prst="straightConnector1">
             <a:avLst/>
@@ -12707,8 +12666,8 @@
         </p:nvCxnSpPr>
         <p:spPr>
           <a:xfrm flipH="1" flipV="1">
-            <a:off x="6324600" y="3886201"/>
-            <a:ext cx="457200" cy="13156"/>
+            <a:off x="6553199" y="3983851"/>
+            <a:ext cx="228601" cy="5159"/>
           </a:xfrm>
           <a:prstGeom prst="straightConnector1">
             <a:avLst/>
@@ -12747,7 +12706,7 @@
         </p:nvSpPr>
         <p:spPr>
           <a:xfrm>
-            <a:off x="6781800" y="3745468"/>
+            <a:off x="6781800" y="3835121"/>
             <a:ext cx="1905000" cy="307777"/>
           </a:xfrm>
           <a:prstGeom prst="rect">
@@ -12791,6 +12750,76 @@
                 </a:solidFill>
               </a:rPr>
               <a:t>2 levels of separation</a:t>
+            </a:r>
+            <a:endParaRPr lang="en-US" dirty="0">
+              <a:solidFill>
+                <a:srgbClr val="20425A"/>
+              </a:solidFill>
+            </a:endParaRPr>
+          </a:p>
+        </p:txBody>
+      </p:sp>
+      <p:sp>
+        <p:nvSpPr>
+          <p:cNvPr id="33" name="TextBox 32">
+            <a:extLst>
+              <a:ext uri="{FF2B5EF4-FFF2-40B4-BE49-F238E27FC236}">
+                <a16:creationId xmlns:a16="http://schemas.microsoft.com/office/drawing/2014/main" id="{58A657A4-579A-4569-A8B6-2B363290B446}"/>
+              </a:ext>
+            </a:extLst>
+          </p:cNvPr>
+          <p:cNvSpPr txBox="1"/>
+          <p:nvPr/>
+        </p:nvSpPr>
+        <p:spPr>
+          <a:xfrm>
+            <a:off x="6553199" y="1806316"/>
+            <a:ext cx="2133601" cy="307777"/>
+          </a:xfrm>
+          <a:prstGeom prst="rect">
+            <a:avLst/>
+          </a:prstGeom>
+          <a:solidFill>
+            <a:schemeClr val="bg1"/>
+          </a:solidFill>
+          <a:effectLst/>
+        </p:spPr>
+        <p:style>
+          <a:lnRef idx="2">
+            <a:schemeClr val="accent6"/>
+          </a:lnRef>
+          <a:fillRef idx="1">
+            <a:schemeClr val="lt1"/>
+          </a:fillRef>
+          <a:effectRef idx="0">
+            <a:schemeClr val="accent6"/>
+          </a:effectRef>
+          <a:fontRef idx="minor">
+            <a:schemeClr val="dk1"/>
+          </a:fontRef>
+        </p:style>
+        <p:txBody>
+          <a:bodyPr wrap="square">
+            <a:spAutoFit/>
+          </a:bodyPr>
+          <a:lstStyle/>
+          <a:p>
+            <a:pPr algn="ctr" fontAlgn="auto">
+              <a:spcBef>
+                <a:spcPts val="0"/>
+              </a:spcBef>
+              <a:spcAft>
+                <a:spcPts val="0"/>
+              </a:spcAft>
+              <a:defRPr/>
+            </a:pPr>
+            <a:r>
+              <a:rPr lang="de-DE" dirty="0">
+                <a:solidFill>
+                  <a:srgbClr val="20425A"/>
+                </a:solidFill>
+              </a:rPr>
+              <a:t>Ancestry Relationships</a:t>
             </a:r>
             <a:endParaRPr lang="en-US" dirty="0">
               <a:solidFill>
@@ -14002,12 +14031,12 @@
       <p:bldP spid="29" grpId="1" animBg="1"/>
       <p:bldP spid="31" grpId="0" animBg="1"/>
       <p:bldP spid="31" grpId="1" animBg="1"/>
-      <p:bldP spid="33" grpId="0" animBg="1"/>
-      <p:bldP spid="33" grpId="1" animBg="1"/>
       <p:bldP spid="40" grpId="0" animBg="1"/>
       <p:bldP spid="41" grpId="0" animBg="1"/>
       <p:bldP spid="44" grpId="0" animBg="1"/>
       <p:bldP spid="46" grpId="0" animBg="1"/>
+      <p:bldP spid="33" grpId="0" animBg="1"/>
+      <p:bldP spid="33" grpId="1" animBg="1"/>
     </p:bldLst>
   </p:timing>
 </p:sld>

</xml_diff>

<commit_message>
Adding HTML version of book description. Changing figure label to white.
</commit_message>
<xml_diff>
--- a/extras/FiguresStandardizedVocabularies.pptx
+++ b/extras/FiguresStandardizedVocabularies.pptx
@@ -507,6 +507,30 @@
                   <c:y val="7.4634019912303062E-2"/>
                 </c:manualLayout>
               </c:layout>
+              <c:spPr>
+                <a:noFill/>
+                <a:ln>
+                  <a:noFill/>
+                </a:ln>
+                <a:effectLst/>
+              </c:spPr>
+              <c:txPr>
+                <a:bodyPr rot="0" spcFirstLastPara="1" vertOverflow="ellipsis" vert="horz" wrap="square" anchor="ctr" anchorCtr="1"/>
+                <a:lstStyle/>
+                <a:p>
+                  <a:pPr>
+                    <a:defRPr sz="1400" b="1" i="0" u="none" strike="noStrike" kern="1200" baseline="0">
+                      <a:solidFill>
+                        <a:schemeClr val="bg1"/>
+                      </a:solidFill>
+                      <a:latin typeface="+mn-lt"/>
+                      <a:ea typeface="+mn-ea"/>
+                      <a:cs typeface="+mn-cs"/>
+                    </a:defRPr>
+                  </a:pPr>
+                  <a:endParaRPr lang="en-US"/>
+                </a:p>
+              </c:txPr>
               <c:dLblPos val="bestFit"/>
               <c:showLegendKey val="0"/>
               <c:showVal val="0"/>
@@ -6618,7 +6642,7 @@
           <p:nvPr>
             <p:extLst>
               <p:ext uri="{D42A27DB-BD31-4B8C-83A1-F6EECF244321}">
-                <p14:modId xmlns:p14="http://schemas.microsoft.com/office/powerpoint/2010/main" val="4134762522"/>
+                <p14:modId xmlns:p14="http://schemas.microsoft.com/office/powerpoint/2010/main" val="492405179"/>
               </p:ext>
             </p:extLst>
           </p:nvPr>

</xml_diff>